<commit_message>
Updated todays notes and code
</commit_message>
<xml_diff>
--- a/HTML/HTML5.pptx
+++ b/HTML/HTML5.pptx
@@ -267,7 +267,7 @@
           <a:p>
             <a:fld id="{48A87A34-81AB-432B-8DAE-1953F412C126}" type="datetimeFigureOut">
               <a:rPr lang="en-US" dirty="0"/>
-              <a:t>8/3/2018</a:t>
+              <a:t>8/7/2018</a:t>
             </a:fld>
             <a:endParaRPr lang="en-US" dirty="0"/>
           </a:p>
@@ -549,7 +549,7 @@
           <a:p>
             <a:fld id="{48A87A34-81AB-432B-8DAE-1953F412C126}" type="datetimeFigureOut">
               <a:rPr lang="en-US" dirty="0"/>
-              <a:t>8/3/2018</a:t>
+              <a:t>8/7/2018</a:t>
             </a:fld>
             <a:endParaRPr lang="en-US" dirty="0"/>
           </a:p>
@@ -736,7 +736,7 @@
           <a:p>
             <a:fld id="{48A87A34-81AB-432B-8DAE-1953F412C126}" type="datetimeFigureOut">
               <a:rPr lang="en-US" dirty="0"/>
-              <a:t>8/3/2018</a:t>
+              <a:t>8/7/2018</a:t>
             </a:fld>
             <a:endParaRPr lang="en-US" dirty="0"/>
           </a:p>
@@ -992,7 +992,7 @@
           <a:p>
             <a:fld id="{48A87A34-81AB-432B-8DAE-1953F412C126}" type="datetimeFigureOut">
               <a:rPr lang="en-US" dirty="0"/>
-              <a:t>8/3/2018</a:t>
+              <a:t>8/7/2018</a:t>
             </a:fld>
             <a:endParaRPr lang="en-US" dirty="0"/>
           </a:p>
@@ -1411,7 +1411,7 @@
           <a:p>
             <a:fld id="{48A87A34-81AB-432B-8DAE-1953F412C126}" type="datetimeFigureOut">
               <a:rPr lang="en-US" dirty="0"/>
-              <a:t>8/3/2018</a:t>
+              <a:t>8/7/2018</a:t>
             </a:fld>
             <a:endParaRPr lang="en-US" dirty="0"/>
           </a:p>
@@ -1952,7 +1952,7 @@
           <a:p>
             <a:fld id="{48A87A34-81AB-432B-8DAE-1953F412C126}" type="datetimeFigureOut">
               <a:rPr lang="en-US" dirty="0"/>
-              <a:t>8/3/2018</a:t>
+              <a:t>8/7/2018</a:t>
             </a:fld>
             <a:endParaRPr lang="en-US" dirty="0"/>
           </a:p>
@@ -2787,7 +2787,7 @@
           <a:p>
             <a:fld id="{48A87A34-81AB-432B-8DAE-1953F412C126}" type="datetimeFigureOut">
               <a:rPr lang="en-US" dirty="0"/>
-              <a:t>8/3/2018</a:t>
+              <a:t>8/7/2018</a:t>
             </a:fld>
             <a:endParaRPr lang="en-US" dirty="0"/>
           </a:p>
@@ -2952,7 +2952,7 @@
           <a:p>
             <a:fld id="{48A87A34-81AB-432B-8DAE-1953F412C126}" type="datetimeFigureOut">
               <a:rPr lang="en-US" dirty="0"/>
-              <a:t>8/3/2018</a:t>
+              <a:t>8/7/2018</a:t>
             </a:fld>
             <a:endParaRPr lang="en-US" dirty="0"/>
           </a:p>
@@ -3131,7 +3131,7 @@
           <a:p>
             <a:fld id="{48A87A34-81AB-432B-8DAE-1953F412C126}" type="datetimeFigureOut">
               <a:rPr lang="en-US" dirty="0"/>
-              <a:t>8/3/2018</a:t>
+              <a:t>8/7/2018</a:t>
             </a:fld>
             <a:endParaRPr lang="en-US" dirty="0"/>
           </a:p>
@@ -3296,7 +3296,7 @@
           <a:p>
             <a:fld id="{48A87A34-81AB-432B-8DAE-1953F412C126}" type="datetimeFigureOut">
               <a:rPr lang="en-US" dirty="0"/>
-              <a:t>8/3/2018</a:t>
+              <a:t>8/7/2018</a:t>
             </a:fld>
             <a:endParaRPr lang="en-US" dirty="0"/>
           </a:p>
@@ -3539,7 +3539,7 @@
           <a:p>
             <a:fld id="{48A87A34-81AB-432B-8DAE-1953F412C126}" type="datetimeFigureOut">
               <a:rPr lang="en-US" dirty="0"/>
-              <a:t>8/3/2018</a:t>
+              <a:t>8/7/2018</a:t>
             </a:fld>
             <a:endParaRPr lang="en-US" dirty="0"/>
           </a:p>
@@ -3771,7 +3771,7 @@
           <a:p>
             <a:fld id="{48A87A34-81AB-432B-8DAE-1953F412C126}" type="datetimeFigureOut">
               <a:rPr lang="en-US" dirty="0"/>
-              <a:t>8/3/2018</a:t>
+              <a:t>8/7/2018</a:t>
             </a:fld>
             <a:endParaRPr lang="en-US" dirty="0"/>
           </a:p>
@@ -4139,7 +4139,7 @@
           <a:p>
             <a:fld id="{48A87A34-81AB-432B-8DAE-1953F412C126}" type="datetimeFigureOut">
               <a:rPr lang="en-US" dirty="0"/>
-              <a:t>8/3/2018</a:t>
+              <a:t>8/7/2018</a:t>
             </a:fld>
             <a:endParaRPr lang="en-US" dirty="0"/>
           </a:p>
@@ -4252,7 +4252,7 @@
           <a:p>
             <a:fld id="{48A87A34-81AB-432B-8DAE-1953F412C126}" type="datetimeFigureOut">
               <a:rPr lang="en-US" dirty="0"/>
-              <a:t>8/3/2018</a:t>
+              <a:t>8/7/2018</a:t>
             </a:fld>
             <a:endParaRPr lang="en-US" dirty="0"/>
           </a:p>
@@ -4342,7 +4342,7 @@
           <a:p>
             <a:fld id="{48A87A34-81AB-432B-8DAE-1953F412C126}" type="datetimeFigureOut">
               <a:rPr lang="en-US" dirty="0"/>
-              <a:t>8/3/2018</a:t>
+              <a:t>8/7/2018</a:t>
             </a:fld>
             <a:endParaRPr lang="en-US" dirty="0"/>
           </a:p>
@@ -4588,7 +4588,7 @@
           <a:p>
             <a:fld id="{48A87A34-81AB-432B-8DAE-1953F412C126}" type="datetimeFigureOut">
               <a:rPr lang="en-US" dirty="0"/>
-              <a:t>8/3/2018</a:t>
+              <a:t>8/7/2018</a:t>
             </a:fld>
             <a:endParaRPr lang="en-US" dirty="0"/>
           </a:p>
@@ -4870,7 +4870,7 @@
           <a:p>
             <a:fld id="{48A87A34-81AB-432B-8DAE-1953F412C126}" type="datetimeFigureOut">
               <a:rPr lang="en-US" dirty="0"/>
-              <a:t>8/3/2018</a:t>
+              <a:t>8/7/2018</a:t>
             </a:fld>
             <a:endParaRPr lang="en-US" dirty="0"/>
           </a:p>
@@ -5079,7 +5079,7 @@
             <a:fld id="{48A87A34-81AB-432B-8DAE-1953F412C126}" type="datetimeFigureOut">
               <a:rPr lang="en-US" dirty="0"/>
               <a:pPr/>
-              <a:t>8/3/2018</a:t>
+              <a:t>8/7/2018</a:t>
             </a:fld>
             <a:endParaRPr lang="en-US" dirty="0"/>
           </a:p>
@@ -8484,14 +8484,13 @@
           <a:p>
             <a:r>
               <a:rPr lang="en-US" dirty="0"/>
-              <a:t>3 states: unvisited,  visited, active</a:t>
-            </a:r>
-          </a:p>
-          <a:p>
-            <a:r>
-              <a:rPr lang="en-US" dirty="0"/>
-              <a:t>Anchor Vs Hyperlink</a:t>
-            </a:r>
+              <a:t>3 states: unvisited,  visited</a:t>
+            </a:r>
+            <a:r>
+              <a:rPr lang="en-US"/>
+              <a:t>, active</a:t>
+            </a:r>
+            <a:endParaRPr lang="en-US" dirty="0"/>
           </a:p>
           <a:p>
             <a:r>

</xml_diff>